<commit_message>
last updates to Doug's version
</commit_message>
<xml_diff>
--- a/icons.pptx
+++ b/icons.pptx
@@ -155,10 +155,9 @@
           </a:lstStyle>
           <a:p>
             <a:r>
-              <a:rPr lang="en-US" smtClean="0"/>
+              <a:rPr lang="en-US"/>
               <a:t>Click to edit Master title style</a:t>
             </a:r>
-            <a:endParaRPr lang="en-US"/>
           </a:p>
         </p:txBody>
       </p:sp>
@@ -220,10 +219,9 @@
           </a:lstStyle>
           <a:p>
             <a:r>
-              <a:rPr lang="en-US" smtClean="0"/>
+              <a:rPr lang="en-US"/>
               <a:t>Click to edit Master subtitle style</a:t>
             </a:r>
-            <a:endParaRPr lang="en-US"/>
           </a:p>
         </p:txBody>
       </p:sp>
@@ -244,7 +242,7 @@
           <a:p>
             <a:fld id="{9A2BE455-E8D0-4C4B-98A5-80B321B7C859}" type="datetimeFigureOut">
               <a:rPr lang="en-US" smtClean="0"/>
-              <a:t>3/29/2019</a:t>
+              <a:t>6/1/2019</a:t>
             </a:fld>
             <a:endParaRPr lang="en-US"/>
           </a:p>
@@ -338,10 +336,9 @@
           <a:lstStyle/>
           <a:p>
             <a:r>
-              <a:rPr lang="en-US" smtClean="0"/>
+              <a:rPr lang="en-US"/>
               <a:t>Click to edit Master title style</a:t>
             </a:r>
-            <a:endParaRPr lang="en-US"/>
           </a:p>
         </p:txBody>
       </p:sp>
@@ -362,38 +359,37 @@
           <a:p>
             <a:pPr lvl="0"/>
             <a:r>
-              <a:rPr lang="en-US" smtClean="0"/>
+              <a:rPr lang="en-US"/>
               <a:t>Edit Master text styles</a:t>
             </a:r>
           </a:p>
           <a:p>
             <a:pPr lvl="1"/>
             <a:r>
-              <a:rPr lang="en-US" smtClean="0"/>
+              <a:rPr lang="en-US"/>
               <a:t>Second level</a:t>
             </a:r>
           </a:p>
           <a:p>
             <a:pPr lvl="2"/>
             <a:r>
-              <a:rPr lang="en-US" smtClean="0"/>
+              <a:rPr lang="en-US"/>
               <a:t>Third level</a:t>
             </a:r>
           </a:p>
           <a:p>
             <a:pPr lvl="3"/>
             <a:r>
-              <a:rPr lang="en-US" smtClean="0"/>
+              <a:rPr lang="en-US"/>
               <a:t>Fourth level</a:t>
             </a:r>
           </a:p>
           <a:p>
             <a:pPr lvl="4"/>
             <a:r>
-              <a:rPr lang="en-US" smtClean="0"/>
+              <a:rPr lang="en-US"/>
               <a:t>Fifth level</a:t>
             </a:r>
-            <a:endParaRPr lang="en-US"/>
           </a:p>
         </p:txBody>
       </p:sp>
@@ -414,7 +410,7 @@
           <a:p>
             <a:fld id="{9A2BE455-E8D0-4C4B-98A5-80B321B7C859}" type="datetimeFigureOut">
               <a:rPr lang="en-US" smtClean="0"/>
-              <a:t>3/29/2019</a:t>
+              <a:t>6/1/2019</a:t>
             </a:fld>
             <a:endParaRPr lang="en-US"/>
           </a:p>
@@ -513,10 +509,9 @@
           <a:lstStyle/>
           <a:p>
             <a:r>
-              <a:rPr lang="en-US" smtClean="0"/>
+              <a:rPr lang="en-US"/>
               <a:t>Click to edit Master title style</a:t>
             </a:r>
-            <a:endParaRPr lang="en-US"/>
           </a:p>
         </p:txBody>
       </p:sp>
@@ -542,38 +537,37 @@
           <a:p>
             <a:pPr lvl="0"/>
             <a:r>
-              <a:rPr lang="en-US" smtClean="0"/>
+              <a:rPr lang="en-US"/>
               <a:t>Edit Master text styles</a:t>
             </a:r>
           </a:p>
           <a:p>
             <a:pPr lvl="1"/>
             <a:r>
-              <a:rPr lang="en-US" smtClean="0"/>
+              <a:rPr lang="en-US"/>
               <a:t>Second level</a:t>
             </a:r>
           </a:p>
           <a:p>
             <a:pPr lvl="2"/>
             <a:r>
-              <a:rPr lang="en-US" smtClean="0"/>
+              <a:rPr lang="en-US"/>
               <a:t>Third level</a:t>
             </a:r>
           </a:p>
           <a:p>
             <a:pPr lvl="3"/>
             <a:r>
-              <a:rPr lang="en-US" smtClean="0"/>
+              <a:rPr lang="en-US"/>
               <a:t>Fourth level</a:t>
             </a:r>
           </a:p>
           <a:p>
             <a:pPr lvl="4"/>
             <a:r>
-              <a:rPr lang="en-US" smtClean="0"/>
+              <a:rPr lang="en-US"/>
               <a:t>Fifth level</a:t>
             </a:r>
-            <a:endParaRPr lang="en-US"/>
           </a:p>
         </p:txBody>
       </p:sp>
@@ -594,7 +588,7 @@
           <a:p>
             <a:fld id="{9A2BE455-E8D0-4C4B-98A5-80B321B7C859}" type="datetimeFigureOut">
               <a:rPr lang="en-US" smtClean="0"/>
-              <a:t>3/29/2019</a:t>
+              <a:t>6/1/2019</a:t>
             </a:fld>
             <a:endParaRPr lang="en-US"/>
           </a:p>
@@ -688,10 +682,9 @@
           <a:lstStyle/>
           <a:p>
             <a:r>
-              <a:rPr lang="en-US" smtClean="0"/>
+              <a:rPr lang="en-US"/>
               <a:t>Click to edit Master title style</a:t>
             </a:r>
-            <a:endParaRPr lang="en-US"/>
           </a:p>
         </p:txBody>
       </p:sp>
@@ -712,38 +705,37 @@
           <a:p>
             <a:pPr lvl="0"/>
             <a:r>
-              <a:rPr lang="en-US" smtClean="0"/>
+              <a:rPr lang="en-US"/>
               <a:t>Edit Master text styles</a:t>
             </a:r>
           </a:p>
           <a:p>
             <a:pPr lvl="1"/>
             <a:r>
-              <a:rPr lang="en-US" smtClean="0"/>
+              <a:rPr lang="en-US"/>
               <a:t>Second level</a:t>
             </a:r>
           </a:p>
           <a:p>
             <a:pPr lvl="2"/>
             <a:r>
-              <a:rPr lang="en-US" smtClean="0"/>
+              <a:rPr lang="en-US"/>
               <a:t>Third level</a:t>
             </a:r>
           </a:p>
           <a:p>
             <a:pPr lvl="3"/>
             <a:r>
-              <a:rPr lang="en-US" smtClean="0"/>
+              <a:rPr lang="en-US"/>
               <a:t>Fourth level</a:t>
             </a:r>
           </a:p>
           <a:p>
             <a:pPr lvl="4"/>
             <a:r>
-              <a:rPr lang="en-US" smtClean="0"/>
+              <a:rPr lang="en-US"/>
               <a:t>Fifth level</a:t>
             </a:r>
-            <a:endParaRPr lang="en-US"/>
           </a:p>
         </p:txBody>
       </p:sp>
@@ -764,7 +756,7 @@
           <a:p>
             <a:fld id="{9A2BE455-E8D0-4C4B-98A5-80B321B7C859}" type="datetimeFigureOut">
               <a:rPr lang="en-US" smtClean="0"/>
-              <a:t>3/29/2019</a:t>
+              <a:t>6/1/2019</a:t>
             </a:fld>
             <a:endParaRPr lang="en-US"/>
           </a:p>
@@ -867,10 +859,9 @@
           </a:lstStyle>
           <a:p>
             <a:r>
-              <a:rPr lang="en-US" smtClean="0"/>
+              <a:rPr lang="en-US"/>
               <a:t>Click to edit Master title style</a:t>
             </a:r>
-            <a:endParaRPr lang="en-US"/>
           </a:p>
         </p:txBody>
       </p:sp>
@@ -987,7 +978,7 @@
           <a:p>
             <a:pPr lvl="0"/>
             <a:r>
-              <a:rPr lang="en-US" smtClean="0"/>
+              <a:rPr lang="en-US"/>
               <a:t>Edit Master text styles</a:t>
             </a:r>
           </a:p>
@@ -1010,7 +1001,7 @@
           <a:p>
             <a:fld id="{9A2BE455-E8D0-4C4B-98A5-80B321B7C859}" type="datetimeFigureOut">
               <a:rPr lang="en-US" smtClean="0"/>
-              <a:t>3/29/2019</a:t>
+              <a:t>6/1/2019</a:t>
             </a:fld>
             <a:endParaRPr lang="en-US"/>
           </a:p>
@@ -1104,10 +1095,9 @@
           <a:lstStyle/>
           <a:p>
             <a:r>
-              <a:rPr lang="en-US" smtClean="0"/>
+              <a:rPr lang="en-US"/>
               <a:t>Click to edit Master title style</a:t>
             </a:r>
-            <a:endParaRPr lang="en-US"/>
           </a:p>
         </p:txBody>
       </p:sp>
@@ -1133,38 +1123,37 @@
           <a:p>
             <a:pPr lvl="0"/>
             <a:r>
-              <a:rPr lang="en-US" smtClean="0"/>
+              <a:rPr lang="en-US"/>
               <a:t>Edit Master text styles</a:t>
             </a:r>
           </a:p>
           <a:p>
             <a:pPr lvl="1"/>
             <a:r>
-              <a:rPr lang="en-US" smtClean="0"/>
+              <a:rPr lang="en-US"/>
               <a:t>Second level</a:t>
             </a:r>
           </a:p>
           <a:p>
             <a:pPr lvl="2"/>
             <a:r>
-              <a:rPr lang="en-US" smtClean="0"/>
+              <a:rPr lang="en-US"/>
               <a:t>Third level</a:t>
             </a:r>
           </a:p>
           <a:p>
             <a:pPr lvl="3"/>
             <a:r>
-              <a:rPr lang="en-US" smtClean="0"/>
+              <a:rPr lang="en-US"/>
               <a:t>Fourth level</a:t>
             </a:r>
           </a:p>
           <a:p>
             <a:pPr lvl="4"/>
             <a:r>
-              <a:rPr lang="en-US" smtClean="0"/>
+              <a:rPr lang="en-US"/>
               <a:t>Fifth level</a:t>
             </a:r>
-            <a:endParaRPr lang="en-US"/>
           </a:p>
         </p:txBody>
       </p:sp>
@@ -1190,38 +1179,37 @@
           <a:p>
             <a:pPr lvl="0"/>
             <a:r>
-              <a:rPr lang="en-US" smtClean="0"/>
+              <a:rPr lang="en-US"/>
               <a:t>Edit Master text styles</a:t>
             </a:r>
           </a:p>
           <a:p>
             <a:pPr lvl="1"/>
             <a:r>
-              <a:rPr lang="en-US" smtClean="0"/>
+              <a:rPr lang="en-US"/>
               <a:t>Second level</a:t>
             </a:r>
           </a:p>
           <a:p>
             <a:pPr lvl="2"/>
             <a:r>
-              <a:rPr lang="en-US" smtClean="0"/>
+              <a:rPr lang="en-US"/>
               <a:t>Third level</a:t>
             </a:r>
           </a:p>
           <a:p>
             <a:pPr lvl="3"/>
             <a:r>
-              <a:rPr lang="en-US" smtClean="0"/>
+              <a:rPr lang="en-US"/>
               <a:t>Fourth level</a:t>
             </a:r>
           </a:p>
           <a:p>
             <a:pPr lvl="4"/>
             <a:r>
-              <a:rPr lang="en-US" smtClean="0"/>
+              <a:rPr lang="en-US"/>
               <a:t>Fifth level</a:t>
             </a:r>
-            <a:endParaRPr lang="en-US"/>
           </a:p>
         </p:txBody>
       </p:sp>
@@ -1242,7 +1230,7 @@
           <a:p>
             <a:fld id="{9A2BE455-E8D0-4C4B-98A5-80B321B7C859}" type="datetimeFigureOut">
               <a:rPr lang="en-US" smtClean="0"/>
-              <a:t>3/29/2019</a:t>
+              <a:t>6/1/2019</a:t>
             </a:fld>
             <a:endParaRPr lang="en-US"/>
           </a:p>
@@ -1341,10 +1329,9 @@
           <a:lstStyle/>
           <a:p>
             <a:r>
-              <a:rPr lang="en-US" smtClean="0"/>
+              <a:rPr lang="en-US"/>
               <a:t>Click to edit Master title style</a:t>
             </a:r>
-            <a:endParaRPr lang="en-US"/>
           </a:p>
         </p:txBody>
       </p:sp>
@@ -1407,7 +1394,7 @@
           <a:p>
             <a:pPr lvl="0"/>
             <a:r>
-              <a:rPr lang="en-US" smtClean="0"/>
+              <a:rPr lang="en-US"/>
               <a:t>Edit Master text styles</a:t>
             </a:r>
           </a:p>
@@ -1435,38 +1422,37 @@
           <a:p>
             <a:pPr lvl="0"/>
             <a:r>
-              <a:rPr lang="en-US" smtClean="0"/>
+              <a:rPr lang="en-US"/>
               <a:t>Edit Master text styles</a:t>
             </a:r>
           </a:p>
           <a:p>
             <a:pPr lvl="1"/>
             <a:r>
-              <a:rPr lang="en-US" smtClean="0"/>
+              <a:rPr lang="en-US"/>
               <a:t>Second level</a:t>
             </a:r>
           </a:p>
           <a:p>
             <a:pPr lvl="2"/>
             <a:r>
-              <a:rPr lang="en-US" smtClean="0"/>
+              <a:rPr lang="en-US"/>
               <a:t>Third level</a:t>
             </a:r>
           </a:p>
           <a:p>
             <a:pPr lvl="3"/>
             <a:r>
-              <a:rPr lang="en-US" smtClean="0"/>
+              <a:rPr lang="en-US"/>
               <a:t>Fourth level</a:t>
             </a:r>
           </a:p>
           <a:p>
             <a:pPr lvl="4"/>
             <a:r>
-              <a:rPr lang="en-US" smtClean="0"/>
+              <a:rPr lang="en-US"/>
               <a:t>Fifth level</a:t>
             </a:r>
-            <a:endParaRPr lang="en-US"/>
           </a:p>
         </p:txBody>
       </p:sp>
@@ -1529,7 +1515,7 @@
           <a:p>
             <a:pPr lvl="0"/>
             <a:r>
-              <a:rPr lang="en-US" smtClean="0"/>
+              <a:rPr lang="en-US"/>
               <a:t>Edit Master text styles</a:t>
             </a:r>
           </a:p>
@@ -1557,38 +1543,37 @@
           <a:p>
             <a:pPr lvl="0"/>
             <a:r>
-              <a:rPr lang="en-US" smtClean="0"/>
+              <a:rPr lang="en-US"/>
               <a:t>Edit Master text styles</a:t>
             </a:r>
           </a:p>
           <a:p>
             <a:pPr lvl="1"/>
             <a:r>
-              <a:rPr lang="en-US" smtClean="0"/>
+              <a:rPr lang="en-US"/>
               <a:t>Second level</a:t>
             </a:r>
           </a:p>
           <a:p>
             <a:pPr lvl="2"/>
             <a:r>
-              <a:rPr lang="en-US" smtClean="0"/>
+              <a:rPr lang="en-US"/>
               <a:t>Third level</a:t>
             </a:r>
           </a:p>
           <a:p>
             <a:pPr lvl="3"/>
             <a:r>
-              <a:rPr lang="en-US" smtClean="0"/>
+              <a:rPr lang="en-US"/>
               <a:t>Fourth level</a:t>
             </a:r>
           </a:p>
           <a:p>
             <a:pPr lvl="4"/>
             <a:r>
-              <a:rPr lang="en-US" smtClean="0"/>
+              <a:rPr lang="en-US"/>
               <a:t>Fifth level</a:t>
             </a:r>
-            <a:endParaRPr lang="en-US"/>
           </a:p>
         </p:txBody>
       </p:sp>
@@ -1609,7 +1594,7 @@
           <a:p>
             <a:fld id="{9A2BE455-E8D0-4C4B-98A5-80B321B7C859}" type="datetimeFigureOut">
               <a:rPr lang="en-US" smtClean="0"/>
-              <a:t>3/29/2019</a:t>
+              <a:t>6/1/2019</a:t>
             </a:fld>
             <a:endParaRPr lang="en-US"/>
           </a:p>
@@ -1703,10 +1688,9 @@
           <a:lstStyle/>
           <a:p>
             <a:r>
-              <a:rPr lang="en-US" smtClean="0"/>
+              <a:rPr lang="en-US"/>
               <a:t>Click to edit Master title style</a:t>
             </a:r>
-            <a:endParaRPr lang="en-US"/>
           </a:p>
         </p:txBody>
       </p:sp>
@@ -1727,7 +1711,7 @@
           <a:p>
             <a:fld id="{9A2BE455-E8D0-4C4B-98A5-80B321B7C859}" type="datetimeFigureOut">
               <a:rPr lang="en-US" smtClean="0"/>
-              <a:t>3/29/2019</a:t>
+              <a:t>6/1/2019</a:t>
             </a:fld>
             <a:endParaRPr lang="en-US"/>
           </a:p>
@@ -1822,7 +1806,7 @@
           <a:p>
             <a:fld id="{9A2BE455-E8D0-4C4B-98A5-80B321B7C859}" type="datetimeFigureOut">
               <a:rPr lang="en-US" smtClean="0"/>
-              <a:t>3/29/2019</a:t>
+              <a:t>6/1/2019</a:t>
             </a:fld>
             <a:endParaRPr lang="en-US"/>
           </a:p>
@@ -1925,10 +1909,9 @@
           </a:lstStyle>
           <a:p>
             <a:r>
-              <a:rPr lang="en-US" smtClean="0"/>
+              <a:rPr lang="en-US"/>
               <a:t>Click to edit Master title style</a:t>
             </a:r>
-            <a:endParaRPr lang="en-US"/>
           </a:p>
         </p:txBody>
       </p:sp>
@@ -1982,38 +1965,37 @@
           <a:p>
             <a:pPr lvl="0"/>
             <a:r>
-              <a:rPr lang="en-US" smtClean="0"/>
+              <a:rPr lang="en-US"/>
               <a:t>Edit Master text styles</a:t>
             </a:r>
           </a:p>
           <a:p>
             <a:pPr lvl="1"/>
             <a:r>
-              <a:rPr lang="en-US" smtClean="0"/>
+              <a:rPr lang="en-US"/>
               <a:t>Second level</a:t>
             </a:r>
           </a:p>
           <a:p>
             <a:pPr lvl="2"/>
             <a:r>
-              <a:rPr lang="en-US" smtClean="0"/>
+              <a:rPr lang="en-US"/>
               <a:t>Third level</a:t>
             </a:r>
           </a:p>
           <a:p>
             <a:pPr lvl="3"/>
             <a:r>
-              <a:rPr lang="en-US" smtClean="0"/>
+              <a:rPr lang="en-US"/>
               <a:t>Fourth level</a:t>
             </a:r>
           </a:p>
           <a:p>
             <a:pPr lvl="4"/>
             <a:r>
-              <a:rPr lang="en-US" smtClean="0"/>
+              <a:rPr lang="en-US"/>
               <a:t>Fifth level</a:t>
             </a:r>
-            <a:endParaRPr lang="en-US"/>
           </a:p>
         </p:txBody>
       </p:sp>
@@ -2076,7 +2058,7 @@
           <a:p>
             <a:pPr lvl="0"/>
             <a:r>
-              <a:rPr lang="en-US" smtClean="0"/>
+              <a:rPr lang="en-US"/>
               <a:t>Edit Master text styles</a:t>
             </a:r>
           </a:p>
@@ -2099,7 +2081,7 @@
           <a:p>
             <a:fld id="{9A2BE455-E8D0-4C4B-98A5-80B321B7C859}" type="datetimeFigureOut">
               <a:rPr lang="en-US" smtClean="0"/>
-              <a:t>3/29/2019</a:t>
+              <a:t>6/1/2019</a:t>
             </a:fld>
             <a:endParaRPr lang="en-US"/>
           </a:p>
@@ -2202,10 +2184,9 @@
           </a:lstStyle>
           <a:p>
             <a:r>
-              <a:rPr lang="en-US" smtClean="0"/>
+              <a:rPr lang="en-US"/>
               <a:t>Click to edit Master title style</a:t>
             </a:r>
-            <a:endParaRPr lang="en-US"/>
           </a:p>
         </p:txBody>
       </p:sp>
@@ -2329,7 +2310,7 @@
           <a:p>
             <a:pPr lvl="0"/>
             <a:r>
-              <a:rPr lang="en-US" smtClean="0"/>
+              <a:rPr lang="en-US"/>
               <a:t>Edit Master text styles</a:t>
             </a:r>
           </a:p>
@@ -2352,7 +2333,7 @@
           <a:p>
             <a:fld id="{9A2BE455-E8D0-4C4B-98A5-80B321B7C859}" type="datetimeFigureOut">
               <a:rPr lang="en-US" smtClean="0"/>
-              <a:t>3/29/2019</a:t>
+              <a:t>6/1/2019</a:t>
             </a:fld>
             <a:endParaRPr lang="en-US"/>
           </a:p>
@@ -2461,10 +2442,9 @@
           <a:lstStyle/>
           <a:p>
             <a:r>
-              <a:rPr lang="en-US" smtClean="0"/>
+              <a:rPr lang="en-US"/>
               <a:t>Click to edit Master title style</a:t>
             </a:r>
-            <a:endParaRPr lang="en-US"/>
           </a:p>
         </p:txBody>
       </p:sp>
@@ -2495,38 +2475,37 @@
           <a:p>
             <a:pPr lvl="0"/>
             <a:r>
-              <a:rPr lang="en-US" smtClean="0"/>
+              <a:rPr lang="en-US"/>
               <a:t>Edit Master text styles</a:t>
             </a:r>
           </a:p>
           <a:p>
             <a:pPr lvl="1"/>
             <a:r>
-              <a:rPr lang="en-US" smtClean="0"/>
+              <a:rPr lang="en-US"/>
               <a:t>Second level</a:t>
             </a:r>
           </a:p>
           <a:p>
             <a:pPr lvl="2"/>
             <a:r>
-              <a:rPr lang="en-US" smtClean="0"/>
+              <a:rPr lang="en-US"/>
               <a:t>Third level</a:t>
             </a:r>
           </a:p>
           <a:p>
             <a:pPr lvl="3"/>
             <a:r>
-              <a:rPr lang="en-US" smtClean="0"/>
+              <a:rPr lang="en-US"/>
               <a:t>Fourth level</a:t>
             </a:r>
           </a:p>
           <a:p>
             <a:pPr lvl="4"/>
             <a:r>
-              <a:rPr lang="en-US" smtClean="0"/>
+              <a:rPr lang="en-US"/>
               <a:t>Fifth level</a:t>
             </a:r>
-            <a:endParaRPr lang="en-US"/>
           </a:p>
         </p:txBody>
       </p:sp>
@@ -2565,7 +2544,7 @@
           <a:p>
             <a:fld id="{9A2BE455-E8D0-4C4B-98A5-80B321B7C859}" type="datetimeFigureOut">
               <a:rPr lang="en-US" smtClean="0"/>
-              <a:t>3/29/2019</a:t>
+              <a:t>6/1/2019</a:t>
             </a:fld>
             <a:endParaRPr lang="en-US"/>
           </a:p>
@@ -4087,6 +4066,775 @@
           </a:extLst>
         </p:spPr>
       </p:pic>
+      <p:sp>
+        <p:nvSpPr>
+          <p:cNvPr id="28" name="Freeform: Shape 27">
+            <a:extLst>
+              <a:ext uri="{FF2B5EF4-FFF2-40B4-BE49-F238E27FC236}">
+                <a16:creationId xmlns:a16="http://schemas.microsoft.com/office/drawing/2014/main" id="{C6006A6F-AA57-4858-9374-F7C746D4A0EF}"/>
+              </a:ext>
+            </a:extLst>
+          </p:cNvPr>
+          <p:cNvSpPr/>
+          <p:nvPr/>
+        </p:nvSpPr>
+        <p:spPr>
+          <a:xfrm>
+            <a:off x="3087834" y="2775870"/>
+            <a:ext cx="153543" cy="198120"/>
+          </a:xfrm>
+          <a:custGeom>
+            <a:avLst/>
+            <a:gdLst>
+              <a:gd name="connsiteX0" fmla="*/ 14859 w 153543"/>
+              <a:gd name="connsiteY0" fmla="*/ 14859 h 198120"/>
+              <a:gd name="connsiteX1" fmla="*/ 138684 w 153543"/>
+              <a:gd name="connsiteY1" fmla="*/ 14859 h 198120"/>
+              <a:gd name="connsiteX2" fmla="*/ 138684 w 153543"/>
+              <a:gd name="connsiteY2" fmla="*/ 183261 h 198120"/>
+              <a:gd name="connsiteX3" fmla="*/ 14859 w 153543"/>
+              <a:gd name="connsiteY3" fmla="*/ 183261 h 198120"/>
+              <a:gd name="connsiteX4" fmla="*/ 14859 w 153543"/>
+              <a:gd name="connsiteY4" fmla="*/ 14859 h 198120"/>
+              <a:gd name="connsiteX5" fmla="*/ 0 w 153543"/>
+              <a:gd name="connsiteY5" fmla="*/ 198120 h 198120"/>
+              <a:gd name="connsiteX6" fmla="*/ 153543 w 153543"/>
+              <a:gd name="connsiteY6" fmla="*/ 198120 h 198120"/>
+              <a:gd name="connsiteX7" fmla="*/ 153543 w 153543"/>
+              <a:gd name="connsiteY7" fmla="*/ 0 h 198120"/>
+              <a:gd name="connsiteX8" fmla="*/ 0 w 153543"/>
+              <a:gd name="connsiteY8" fmla="*/ 0 h 198120"/>
+              <a:gd name="connsiteX9" fmla="*/ 0 w 153543"/>
+              <a:gd name="connsiteY9" fmla="*/ 198120 h 198120"/>
+            </a:gdLst>
+            <a:ahLst/>
+            <a:cxnLst>
+              <a:cxn ang="0">
+                <a:pos x="connsiteX0" y="connsiteY0"/>
+              </a:cxn>
+              <a:cxn ang="0">
+                <a:pos x="connsiteX1" y="connsiteY1"/>
+              </a:cxn>
+              <a:cxn ang="0">
+                <a:pos x="connsiteX2" y="connsiteY2"/>
+              </a:cxn>
+              <a:cxn ang="0">
+                <a:pos x="connsiteX3" y="connsiteY3"/>
+              </a:cxn>
+              <a:cxn ang="0">
+                <a:pos x="connsiteX4" y="connsiteY4"/>
+              </a:cxn>
+              <a:cxn ang="0">
+                <a:pos x="connsiteX5" y="connsiteY5"/>
+              </a:cxn>
+              <a:cxn ang="0">
+                <a:pos x="connsiteX6" y="connsiteY6"/>
+              </a:cxn>
+              <a:cxn ang="0">
+                <a:pos x="connsiteX7" y="connsiteY7"/>
+              </a:cxn>
+              <a:cxn ang="0">
+                <a:pos x="connsiteX8" y="connsiteY8"/>
+              </a:cxn>
+              <a:cxn ang="0">
+                <a:pos x="connsiteX9" y="connsiteY9"/>
+              </a:cxn>
+            </a:cxnLst>
+            <a:rect l="l" t="t" r="r" b="b"/>
+            <a:pathLst>
+              <a:path w="153543" h="198120">
+                <a:moveTo>
+                  <a:pt x="14859" y="14859"/>
+                </a:moveTo>
+                <a:lnTo>
+                  <a:pt x="138684" y="14859"/>
+                </a:lnTo>
+                <a:lnTo>
+                  <a:pt x="138684" y="183261"/>
+                </a:lnTo>
+                <a:lnTo>
+                  <a:pt x="14859" y="183261"/>
+                </a:lnTo>
+                <a:lnTo>
+                  <a:pt x="14859" y="14859"/>
+                </a:lnTo>
+                <a:close/>
+                <a:moveTo>
+                  <a:pt x="0" y="198120"/>
+                </a:moveTo>
+                <a:lnTo>
+                  <a:pt x="153543" y="198120"/>
+                </a:lnTo>
+                <a:lnTo>
+                  <a:pt x="153543" y="0"/>
+                </a:lnTo>
+                <a:lnTo>
+                  <a:pt x="0" y="0"/>
+                </a:lnTo>
+                <a:lnTo>
+                  <a:pt x="0" y="198120"/>
+                </a:lnTo>
+                <a:close/>
+              </a:path>
+            </a:pathLst>
+          </a:custGeom>
+          <a:solidFill>
+            <a:srgbClr val="000000"/>
+          </a:solidFill>
+          <a:ln w="2381" cap="flat">
+            <a:noFill/>
+            <a:prstDash val="solid"/>
+            <a:miter/>
+          </a:ln>
+        </p:spPr>
+        <p:txBody>
+          <a:bodyPr rtlCol="0" anchor="ctr"/>
+          <a:lstStyle/>
+          <a:p>
+            <a:endParaRPr lang="en-US"/>
+          </a:p>
+        </p:txBody>
+      </p:sp>
+      <p:sp>
+        <p:nvSpPr>
+          <p:cNvPr id="29" name="Freeform: Shape 28">
+            <a:extLst>
+              <a:ext uri="{FF2B5EF4-FFF2-40B4-BE49-F238E27FC236}">
+                <a16:creationId xmlns:a16="http://schemas.microsoft.com/office/drawing/2014/main" id="{2CD54E5A-46ED-43E8-AE36-A8AC08A05492}"/>
+              </a:ext>
+            </a:extLst>
+          </p:cNvPr>
+          <p:cNvSpPr/>
+          <p:nvPr/>
+        </p:nvSpPr>
+        <p:spPr>
+          <a:xfrm>
+            <a:off x="3120028" y="2805588"/>
+            <a:ext cx="19812" cy="19812"/>
+          </a:xfrm>
+          <a:custGeom>
+            <a:avLst/>
+            <a:gdLst>
+              <a:gd name="connsiteX0" fmla="*/ 0 w 19812"/>
+              <a:gd name="connsiteY0" fmla="*/ 0 h 19812"/>
+              <a:gd name="connsiteX1" fmla="*/ 19812 w 19812"/>
+              <a:gd name="connsiteY1" fmla="*/ 0 h 19812"/>
+              <a:gd name="connsiteX2" fmla="*/ 19812 w 19812"/>
+              <a:gd name="connsiteY2" fmla="*/ 19812 h 19812"/>
+              <a:gd name="connsiteX3" fmla="*/ 0 w 19812"/>
+              <a:gd name="connsiteY3" fmla="*/ 19812 h 19812"/>
+            </a:gdLst>
+            <a:ahLst/>
+            <a:cxnLst>
+              <a:cxn ang="0">
+                <a:pos x="connsiteX0" y="connsiteY0"/>
+              </a:cxn>
+              <a:cxn ang="0">
+                <a:pos x="connsiteX1" y="connsiteY1"/>
+              </a:cxn>
+              <a:cxn ang="0">
+                <a:pos x="connsiteX2" y="connsiteY2"/>
+              </a:cxn>
+              <a:cxn ang="0">
+                <a:pos x="connsiteX3" y="connsiteY3"/>
+              </a:cxn>
+            </a:cxnLst>
+            <a:rect l="l" t="t" r="r" b="b"/>
+            <a:pathLst>
+              <a:path w="19812" h="19812">
+                <a:moveTo>
+                  <a:pt x="0" y="0"/>
+                </a:moveTo>
+                <a:lnTo>
+                  <a:pt x="19812" y="0"/>
+                </a:lnTo>
+                <a:lnTo>
+                  <a:pt x="19812" y="19812"/>
+                </a:lnTo>
+                <a:lnTo>
+                  <a:pt x="0" y="19812"/>
+                </a:lnTo>
+                <a:close/>
+              </a:path>
+            </a:pathLst>
+          </a:custGeom>
+          <a:solidFill>
+            <a:srgbClr val="000000"/>
+          </a:solidFill>
+          <a:ln w="2381" cap="flat">
+            <a:noFill/>
+            <a:prstDash val="solid"/>
+            <a:miter/>
+          </a:ln>
+        </p:spPr>
+        <p:txBody>
+          <a:bodyPr rtlCol="0" anchor="ctr"/>
+          <a:lstStyle/>
+          <a:p>
+            <a:endParaRPr lang="en-US"/>
+          </a:p>
+        </p:txBody>
+      </p:sp>
+      <p:sp>
+        <p:nvSpPr>
+          <p:cNvPr id="32" name="Freeform: Shape 31">
+            <a:extLst>
+              <a:ext uri="{FF2B5EF4-FFF2-40B4-BE49-F238E27FC236}">
+                <a16:creationId xmlns:a16="http://schemas.microsoft.com/office/drawing/2014/main" id="{031CE2EF-F070-463A-AA90-C707A807F0C5}"/>
+              </a:ext>
+            </a:extLst>
+          </p:cNvPr>
+          <p:cNvSpPr/>
+          <p:nvPr/>
+        </p:nvSpPr>
+        <p:spPr>
+          <a:xfrm>
+            <a:off x="3159652" y="2810541"/>
+            <a:ext cx="49530" cy="9906"/>
+          </a:xfrm>
+          <a:custGeom>
+            <a:avLst/>
+            <a:gdLst>
+              <a:gd name="connsiteX0" fmla="*/ 0 w 49530"/>
+              <a:gd name="connsiteY0" fmla="*/ 0 h 9906"/>
+              <a:gd name="connsiteX1" fmla="*/ 49530 w 49530"/>
+              <a:gd name="connsiteY1" fmla="*/ 0 h 9906"/>
+              <a:gd name="connsiteX2" fmla="*/ 49530 w 49530"/>
+              <a:gd name="connsiteY2" fmla="*/ 9906 h 9906"/>
+              <a:gd name="connsiteX3" fmla="*/ 0 w 49530"/>
+              <a:gd name="connsiteY3" fmla="*/ 9906 h 9906"/>
+            </a:gdLst>
+            <a:ahLst/>
+            <a:cxnLst>
+              <a:cxn ang="0">
+                <a:pos x="connsiteX0" y="connsiteY0"/>
+              </a:cxn>
+              <a:cxn ang="0">
+                <a:pos x="connsiteX1" y="connsiteY1"/>
+              </a:cxn>
+              <a:cxn ang="0">
+                <a:pos x="connsiteX2" y="connsiteY2"/>
+              </a:cxn>
+              <a:cxn ang="0">
+                <a:pos x="connsiteX3" y="connsiteY3"/>
+              </a:cxn>
+            </a:cxnLst>
+            <a:rect l="l" t="t" r="r" b="b"/>
+            <a:pathLst>
+              <a:path w="49530" h="9906">
+                <a:moveTo>
+                  <a:pt x="0" y="0"/>
+                </a:moveTo>
+                <a:lnTo>
+                  <a:pt x="49530" y="0"/>
+                </a:lnTo>
+                <a:lnTo>
+                  <a:pt x="49530" y="9906"/>
+                </a:lnTo>
+                <a:lnTo>
+                  <a:pt x="0" y="9906"/>
+                </a:lnTo>
+                <a:close/>
+              </a:path>
+            </a:pathLst>
+          </a:custGeom>
+          <a:solidFill>
+            <a:srgbClr val="000000"/>
+          </a:solidFill>
+          <a:ln w="2381" cap="flat">
+            <a:noFill/>
+            <a:prstDash val="solid"/>
+            <a:miter/>
+          </a:ln>
+        </p:spPr>
+        <p:txBody>
+          <a:bodyPr rtlCol="0" anchor="ctr"/>
+          <a:lstStyle/>
+          <a:p>
+            <a:endParaRPr lang="en-US"/>
+          </a:p>
+        </p:txBody>
+      </p:sp>
+      <p:sp>
+        <p:nvSpPr>
+          <p:cNvPr id="34" name="Freeform: Shape 33">
+            <a:extLst>
+              <a:ext uri="{FF2B5EF4-FFF2-40B4-BE49-F238E27FC236}">
+                <a16:creationId xmlns:a16="http://schemas.microsoft.com/office/drawing/2014/main" id="{299E9493-9D6E-44E8-8CF4-C13E0AF0EC9C}"/>
+              </a:ext>
+            </a:extLst>
+          </p:cNvPr>
+          <p:cNvSpPr/>
+          <p:nvPr/>
+        </p:nvSpPr>
+        <p:spPr>
+          <a:xfrm>
+            <a:off x="3120028" y="2845212"/>
+            <a:ext cx="19812" cy="19812"/>
+          </a:xfrm>
+          <a:custGeom>
+            <a:avLst/>
+            <a:gdLst>
+              <a:gd name="connsiteX0" fmla="*/ 0 w 19812"/>
+              <a:gd name="connsiteY0" fmla="*/ 0 h 19812"/>
+              <a:gd name="connsiteX1" fmla="*/ 19812 w 19812"/>
+              <a:gd name="connsiteY1" fmla="*/ 0 h 19812"/>
+              <a:gd name="connsiteX2" fmla="*/ 19812 w 19812"/>
+              <a:gd name="connsiteY2" fmla="*/ 19812 h 19812"/>
+              <a:gd name="connsiteX3" fmla="*/ 0 w 19812"/>
+              <a:gd name="connsiteY3" fmla="*/ 19812 h 19812"/>
+            </a:gdLst>
+            <a:ahLst/>
+            <a:cxnLst>
+              <a:cxn ang="0">
+                <a:pos x="connsiteX0" y="connsiteY0"/>
+              </a:cxn>
+              <a:cxn ang="0">
+                <a:pos x="connsiteX1" y="connsiteY1"/>
+              </a:cxn>
+              <a:cxn ang="0">
+                <a:pos x="connsiteX2" y="connsiteY2"/>
+              </a:cxn>
+              <a:cxn ang="0">
+                <a:pos x="connsiteX3" y="connsiteY3"/>
+              </a:cxn>
+            </a:cxnLst>
+            <a:rect l="l" t="t" r="r" b="b"/>
+            <a:pathLst>
+              <a:path w="19812" h="19812">
+                <a:moveTo>
+                  <a:pt x="0" y="0"/>
+                </a:moveTo>
+                <a:lnTo>
+                  <a:pt x="19812" y="0"/>
+                </a:lnTo>
+                <a:lnTo>
+                  <a:pt x="19812" y="19812"/>
+                </a:lnTo>
+                <a:lnTo>
+                  <a:pt x="0" y="19812"/>
+                </a:lnTo>
+                <a:close/>
+              </a:path>
+            </a:pathLst>
+          </a:custGeom>
+          <a:solidFill>
+            <a:srgbClr val="000000"/>
+          </a:solidFill>
+          <a:ln w="2381" cap="flat">
+            <a:noFill/>
+            <a:prstDash val="solid"/>
+            <a:miter/>
+          </a:ln>
+        </p:spPr>
+        <p:txBody>
+          <a:bodyPr rtlCol="0" anchor="ctr"/>
+          <a:lstStyle/>
+          <a:p>
+            <a:endParaRPr lang="en-US"/>
+          </a:p>
+        </p:txBody>
+      </p:sp>
+      <p:sp>
+        <p:nvSpPr>
+          <p:cNvPr id="36" name="Freeform: Shape 35">
+            <a:extLst>
+              <a:ext uri="{FF2B5EF4-FFF2-40B4-BE49-F238E27FC236}">
+                <a16:creationId xmlns:a16="http://schemas.microsoft.com/office/drawing/2014/main" id="{8BB47569-F201-475C-B963-290327059504}"/>
+              </a:ext>
+            </a:extLst>
+          </p:cNvPr>
+          <p:cNvSpPr/>
+          <p:nvPr/>
+        </p:nvSpPr>
+        <p:spPr>
+          <a:xfrm>
+            <a:off x="3159652" y="2850165"/>
+            <a:ext cx="49530" cy="9906"/>
+          </a:xfrm>
+          <a:custGeom>
+            <a:avLst/>
+            <a:gdLst>
+              <a:gd name="connsiteX0" fmla="*/ 0 w 49530"/>
+              <a:gd name="connsiteY0" fmla="*/ 0 h 9906"/>
+              <a:gd name="connsiteX1" fmla="*/ 49530 w 49530"/>
+              <a:gd name="connsiteY1" fmla="*/ 0 h 9906"/>
+              <a:gd name="connsiteX2" fmla="*/ 49530 w 49530"/>
+              <a:gd name="connsiteY2" fmla="*/ 9906 h 9906"/>
+              <a:gd name="connsiteX3" fmla="*/ 0 w 49530"/>
+              <a:gd name="connsiteY3" fmla="*/ 9906 h 9906"/>
+            </a:gdLst>
+            <a:ahLst/>
+            <a:cxnLst>
+              <a:cxn ang="0">
+                <a:pos x="connsiteX0" y="connsiteY0"/>
+              </a:cxn>
+              <a:cxn ang="0">
+                <a:pos x="connsiteX1" y="connsiteY1"/>
+              </a:cxn>
+              <a:cxn ang="0">
+                <a:pos x="connsiteX2" y="connsiteY2"/>
+              </a:cxn>
+              <a:cxn ang="0">
+                <a:pos x="connsiteX3" y="connsiteY3"/>
+              </a:cxn>
+            </a:cxnLst>
+            <a:rect l="l" t="t" r="r" b="b"/>
+            <a:pathLst>
+              <a:path w="49530" h="9906">
+                <a:moveTo>
+                  <a:pt x="0" y="0"/>
+                </a:moveTo>
+                <a:lnTo>
+                  <a:pt x="49530" y="0"/>
+                </a:lnTo>
+                <a:lnTo>
+                  <a:pt x="49530" y="9906"/>
+                </a:lnTo>
+                <a:lnTo>
+                  <a:pt x="0" y="9906"/>
+                </a:lnTo>
+                <a:close/>
+              </a:path>
+            </a:pathLst>
+          </a:custGeom>
+          <a:solidFill>
+            <a:srgbClr val="000000"/>
+          </a:solidFill>
+          <a:ln w="2381" cap="flat">
+            <a:noFill/>
+            <a:prstDash val="solid"/>
+            <a:miter/>
+          </a:ln>
+        </p:spPr>
+        <p:txBody>
+          <a:bodyPr rtlCol="0" anchor="ctr"/>
+          <a:lstStyle/>
+          <a:p>
+            <a:endParaRPr lang="en-US"/>
+          </a:p>
+        </p:txBody>
+      </p:sp>
+      <p:sp>
+        <p:nvSpPr>
+          <p:cNvPr id="37" name="Freeform: Shape 36">
+            <a:extLst>
+              <a:ext uri="{FF2B5EF4-FFF2-40B4-BE49-F238E27FC236}">
+                <a16:creationId xmlns:a16="http://schemas.microsoft.com/office/drawing/2014/main" id="{23524B65-A813-411E-991B-CE4A99B13896}"/>
+              </a:ext>
+            </a:extLst>
+          </p:cNvPr>
+          <p:cNvSpPr/>
+          <p:nvPr/>
+        </p:nvSpPr>
+        <p:spPr>
+          <a:xfrm>
+            <a:off x="3120028" y="2884836"/>
+            <a:ext cx="19812" cy="19812"/>
+          </a:xfrm>
+          <a:custGeom>
+            <a:avLst/>
+            <a:gdLst>
+              <a:gd name="connsiteX0" fmla="*/ 0 w 19812"/>
+              <a:gd name="connsiteY0" fmla="*/ 0 h 19812"/>
+              <a:gd name="connsiteX1" fmla="*/ 19812 w 19812"/>
+              <a:gd name="connsiteY1" fmla="*/ 0 h 19812"/>
+              <a:gd name="connsiteX2" fmla="*/ 19812 w 19812"/>
+              <a:gd name="connsiteY2" fmla="*/ 19812 h 19812"/>
+              <a:gd name="connsiteX3" fmla="*/ 0 w 19812"/>
+              <a:gd name="connsiteY3" fmla="*/ 19812 h 19812"/>
+            </a:gdLst>
+            <a:ahLst/>
+            <a:cxnLst>
+              <a:cxn ang="0">
+                <a:pos x="connsiteX0" y="connsiteY0"/>
+              </a:cxn>
+              <a:cxn ang="0">
+                <a:pos x="connsiteX1" y="connsiteY1"/>
+              </a:cxn>
+              <a:cxn ang="0">
+                <a:pos x="connsiteX2" y="connsiteY2"/>
+              </a:cxn>
+              <a:cxn ang="0">
+                <a:pos x="connsiteX3" y="connsiteY3"/>
+              </a:cxn>
+            </a:cxnLst>
+            <a:rect l="l" t="t" r="r" b="b"/>
+            <a:pathLst>
+              <a:path w="19812" h="19812">
+                <a:moveTo>
+                  <a:pt x="0" y="0"/>
+                </a:moveTo>
+                <a:lnTo>
+                  <a:pt x="19812" y="0"/>
+                </a:lnTo>
+                <a:lnTo>
+                  <a:pt x="19812" y="19812"/>
+                </a:lnTo>
+                <a:lnTo>
+                  <a:pt x="0" y="19812"/>
+                </a:lnTo>
+                <a:close/>
+              </a:path>
+            </a:pathLst>
+          </a:custGeom>
+          <a:solidFill>
+            <a:srgbClr val="000000"/>
+          </a:solidFill>
+          <a:ln w="2381" cap="flat">
+            <a:noFill/>
+            <a:prstDash val="solid"/>
+            <a:miter/>
+          </a:ln>
+        </p:spPr>
+        <p:txBody>
+          <a:bodyPr rtlCol="0" anchor="ctr"/>
+          <a:lstStyle/>
+          <a:p>
+            <a:endParaRPr lang="en-US"/>
+          </a:p>
+        </p:txBody>
+      </p:sp>
+      <p:sp>
+        <p:nvSpPr>
+          <p:cNvPr id="38" name="Freeform: Shape 37">
+            <a:extLst>
+              <a:ext uri="{FF2B5EF4-FFF2-40B4-BE49-F238E27FC236}">
+                <a16:creationId xmlns:a16="http://schemas.microsoft.com/office/drawing/2014/main" id="{DB373FAC-1AF0-43EA-9F56-8AD32BDCF484}"/>
+              </a:ext>
+            </a:extLst>
+          </p:cNvPr>
+          <p:cNvSpPr/>
+          <p:nvPr/>
+        </p:nvSpPr>
+        <p:spPr>
+          <a:xfrm>
+            <a:off x="3159652" y="2889789"/>
+            <a:ext cx="49530" cy="9906"/>
+          </a:xfrm>
+          <a:custGeom>
+            <a:avLst/>
+            <a:gdLst>
+              <a:gd name="connsiteX0" fmla="*/ 0 w 49530"/>
+              <a:gd name="connsiteY0" fmla="*/ 0 h 9906"/>
+              <a:gd name="connsiteX1" fmla="*/ 49530 w 49530"/>
+              <a:gd name="connsiteY1" fmla="*/ 0 h 9906"/>
+              <a:gd name="connsiteX2" fmla="*/ 49530 w 49530"/>
+              <a:gd name="connsiteY2" fmla="*/ 9906 h 9906"/>
+              <a:gd name="connsiteX3" fmla="*/ 0 w 49530"/>
+              <a:gd name="connsiteY3" fmla="*/ 9906 h 9906"/>
+            </a:gdLst>
+            <a:ahLst/>
+            <a:cxnLst>
+              <a:cxn ang="0">
+                <a:pos x="connsiteX0" y="connsiteY0"/>
+              </a:cxn>
+              <a:cxn ang="0">
+                <a:pos x="connsiteX1" y="connsiteY1"/>
+              </a:cxn>
+              <a:cxn ang="0">
+                <a:pos x="connsiteX2" y="connsiteY2"/>
+              </a:cxn>
+              <a:cxn ang="0">
+                <a:pos x="connsiteX3" y="connsiteY3"/>
+              </a:cxn>
+            </a:cxnLst>
+            <a:rect l="l" t="t" r="r" b="b"/>
+            <a:pathLst>
+              <a:path w="49530" h="9906">
+                <a:moveTo>
+                  <a:pt x="0" y="0"/>
+                </a:moveTo>
+                <a:lnTo>
+                  <a:pt x="49530" y="0"/>
+                </a:lnTo>
+                <a:lnTo>
+                  <a:pt x="49530" y="9906"/>
+                </a:lnTo>
+                <a:lnTo>
+                  <a:pt x="0" y="9906"/>
+                </a:lnTo>
+                <a:close/>
+              </a:path>
+            </a:pathLst>
+          </a:custGeom>
+          <a:solidFill>
+            <a:srgbClr val="000000"/>
+          </a:solidFill>
+          <a:ln w="2381" cap="flat">
+            <a:noFill/>
+            <a:prstDash val="solid"/>
+            <a:miter/>
+          </a:ln>
+        </p:spPr>
+        <p:txBody>
+          <a:bodyPr rtlCol="0" anchor="ctr"/>
+          <a:lstStyle/>
+          <a:p>
+            <a:endParaRPr lang="en-US"/>
+          </a:p>
+        </p:txBody>
+      </p:sp>
+      <p:sp>
+        <p:nvSpPr>
+          <p:cNvPr id="39" name="Freeform: Shape 38">
+            <a:extLst>
+              <a:ext uri="{FF2B5EF4-FFF2-40B4-BE49-F238E27FC236}">
+                <a16:creationId xmlns:a16="http://schemas.microsoft.com/office/drawing/2014/main" id="{157C288F-B84B-47D2-95F7-59A7A06D73D5}"/>
+              </a:ext>
+            </a:extLst>
+          </p:cNvPr>
+          <p:cNvSpPr/>
+          <p:nvPr/>
+        </p:nvSpPr>
+        <p:spPr>
+          <a:xfrm>
+            <a:off x="3120028" y="2924460"/>
+            <a:ext cx="19812" cy="19812"/>
+          </a:xfrm>
+          <a:custGeom>
+            <a:avLst/>
+            <a:gdLst>
+              <a:gd name="connsiteX0" fmla="*/ 0 w 19812"/>
+              <a:gd name="connsiteY0" fmla="*/ 0 h 19812"/>
+              <a:gd name="connsiteX1" fmla="*/ 19812 w 19812"/>
+              <a:gd name="connsiteY1" fmla="*/ 0 h 19812"/>
+              <a:gd name="connsiteX2" fmla="*/ 19812 w 19812"/>
+              <a:gd name="connsiteY2" fmla="*/ 19812 h 19812"/>
+              <a:gd name="connsiteX3" fmla="*/ 0 w 19812"/>
+              <a:gd name="connsiteY3" fmla="*/ 19812 h 19812"/>
+            </a:gdLst>
+            <a:ahLst/>
+            <a:cxnLst>
+              <a:cxn ang="0">
+                <a:pos x="connsiteX0" y="connsiteY0"/>
+              </a:cxn>
+              <a:cxn ang="0">
+                <a:pos x="connsiteX1" y="connsiteY1"/>
+              </a:cxn>
+              <a:cxn ang="0">
+                <a:pos x="connsiteX2" y="connsiteY2"/>
+              </a:cxn>
+              <a:cxn ang="0">
+                <a:pos x="connsiteX3" y="connsiteY3"/>
+              </a:cxn>
+            </a:cxnLst>
+            <a:rect l="l" t="t" r="r" b="b"/>
+            <a:pathLst>
+              <a:path w="19812" h="19812">
+                <a:moveTo>
+                  <a:pt x="0" y="0"/>
+                </a:moveTo>
+                <a:lnTo>
+                  <a:pt x="19812" y="0"/>
+                </a:lnTo>
+                <a:lnTo>
+                  <a:pt x="19812" y="19812"/>
+                </a:lnTo>
+                <a:lnTo>
+                  <a:pt x="0" y="19812"/>
+                </a:lnTo>
+                <a:close/>
+              </a:path>
+            </a:pathLst>
+          </a:custGeom>
+          <a:solidFill>
+            <a:srgbClr val="000000"/>
+          </a:solidFill>
+          <a:ln w="2381" cap="flat">
+            <a:noFill/>
+            <a:prstDash val="solid"/>
+            <a:miter/>
+          </a:ln>
+        </p:spPr>
+        <p:txBody>
+          <a:bodyPr rtlCol="0" anchor="ctr"/>
+          <a:lstStyle/>
+          <a:p>
+            <a:endParaRPr lang="en-US"/>
+          </a:p>
+        </p:txBody>
+      </p:sp>
+      <p:sp>
+        <p:nvSpPr>
+          <p:cNvPr id="40" name="Freeform: Shape 39">
+            <a:extLst>
+              <a:ext uri="{FF2B5EF4-FFF2-40B4-BE49-F238E27FC236}">
+                <a16:creationId xmlns:a16="http://schemas.microsoft.com/office/drawing/2014/main" id="{37B114A6-550D-4A4E-8ED6-D6DD045BBC04}"/>
+              </a:ext>
+            </a:extLst>
+          </p:cNvPr>
+          <p:cNvSpPr/>
+          <p:nvPr/>
+        </p:nvSpPr>
+        <p:spPr>
+          <a:xfrm>
+            <a:off x="3159652" y="2929413"/>
+            <a:ext cx="49530" cy="9906"/>
+          </a:xfrm>
+          <a:custGeom>
+            <a:avLst/>
+            <a:gdLst>
+              <a:gd name="connsiteX0" fmla="*/ 0 w 49530"/>
+              <a:gd name="connsiteY0" fmla="*/ 0 h 9906"/>
+              <a:gd name="connsiteX1" fmla="*/ 49530 w 49530"/>
+              <a:gd name="connsiteY1" fmla="*/ 0 h 9906"/>
+              <a:gd name="connsiteX2" fmla="*/ 49530 w 49530"/>
+              <a:gd name="connsiteY2" fmla="*/ 9906 h 9906"/>
+              <a:gd name="connsiteX3" fmla="*/ 0 w 49530"/>
+              <a:gd name="connsiteY3" fmla="*/ 9906 h 9906"/>
+            </a:gdLst>
+            <a:ahLst/>
+            <a:cxnLst>
+              <a:cxn ang="0">
+                <a:pos x="connsiteX0" y="connsiteY0"/>
+              </a:cxn>
+              <a:cxn ang="0">
+                <a:pos x="connsiteX1" y="connsiteY1"/>
+              </a:cxn>
+              <a:cxn ang="0">
+                <a:pos x="connsiteX2" y="connsiteY2"/>
+              </a:cxn>
+              <a:cxn ang="0">
+                <a:pos x="connsiteX3" y="connsiteY3"/>
+              </a:cxn>
+            </a:cxnLst>
+            <a:rect l="l" t="t" r="r" b="b"/>
+            <a:pathLst>
+              <a:path w="49530" h="9906">
+                <a:moveTo>
+                  <a:pt x="0" y="0"/>
+                </a:moveTo>
+                <a:lnTo>
+                  <a:pt x="49530" y="0"/>
+                </a:lnTo>
+                <a:lnTo>
+                  <a:pt x="49530" y="9906"/>
+                </a:lnTo>
+                <a:lnTo>
+                  <a:pt x="0" y="9906"/>
+                </a:lnTo>
+                <a:close/>
+              </a:path>
+            </a:pathLst>
+          </a:custGeom>
+          <a:solidFill>
+            <a:srgbClr val="000000"/>
+          </a:solidFill>
+          <a:ln w="2381" cap="flat">
+            <a:noFill/>
+            <a:prstDash val="solid"/>
+            <a:miter/>
+          </a:ln>
+        </p:spPr>
+        <p:txBody>
+          <a:bodyPr rtlCol="0" anchor="ctr"/>
+          <a:lstStyle/>
+          <a:p>
+            <a:endParaRPr lang="en-US"/>
+          </a:p>
+        </p:txBody>
+      </p:sp>
     </p:spTree>
     <p:extLst>
       <p:ext uri="{BB962C8B-B14F-4D97-AF65-F5344CB8AC3E}">
@@ -4097,13 +4845,6 @@
   <p:clrMapOvr>
     <a:masterClrMapping/>
   </p:clrMapOvr>
-  <p:timing>
-    <p:tnLst>
-      <p:par>
-        <p:cTn id="1" dur="indefinite" restart="never" nodeType="tmRoot"/>
-      </p:par>
-    </p:tnLst>
-  </p:timing>
 </p:sld>
 </file>
 
@@ -4172,13 +4913,6 @@
   <p:clrMapOvr>
     <a:masterClrMapping/>
   </p:clrMapOvr>
-  <p:timing>
-    <p:tnLst>
-      <p:par>
-        <p:cTn id="1" dur="indefinite" restart="never" nodeType="tmRoot"/>
-      </p:par>
-    </p:tnLst>
-  </p:timing>
 </p:sld>
 </file>
 

</xml_diff>